<commit_message>
First Zenodo release to get DOI
</commit_message>
<xml_diff>
--- a/Shiny/www/Fig1.pptx
+++ b/Shiny/www/Fig1.pptx
@@ -3709,6 +3709,244 @@
                   </a:solidFill>
                 </a:rPr>
                 <a:t>3</a:t>
+              </a:r>
+            </a:p>
+          </p:txBody>
+        </p:sp>
+      </p:grpSp>
+      <p:grpSp>
+        <p:nvGrpSpPr>
+          <p:cNvPr id="12" name="Group 11">
+            <a:extLst>
+              <a:ext uri="{FF2B5EF4-FFF2-40B4-BE49-F238E27FC236}">
+                <a16:creationId xmlns:a16="http://schemas.microsoft.com/office/drawing/2014/main" id="{1826C471-DF43-3173-4645-E95466CE1F7D}"/>
+              </a:ext>
+            </a:extLst>
+          </p:cNvPr>
+          <p:cNvGrpSpPr/>
+          <p:nvPr/>
+        </p:nvGrpSpPr>
+        <p:grpSpPr>
+          <a:xfrm>
+            <a:off x="8473395" y="1488705"/>
+            <a:ext cx="324091" cy="369332"/>
+            <a:chOff x="1653616" y="1220461"/>
+            <a:chExt cx="324091" cy="369332"/>
+          </a:xfrm>
+        </p:grpSpPr>
+        <p:sp>
+          <p:nvSpPr>
+            <p:cNvPr id="13" name="Oval 12">
+              <a:extLst>
+                <a:ext uri="{FF2B5EF4-FFF2-40B4-BE49-F238E27FC236}">
+                  <a16:creationId xmlns:a16="http://schemas.microsoft.com/office/drawing/2014/main" id="{6BF0F120-FE24-DF84-3A33-2D3299652DE6}"/>
+                </a:ext>
+              </a:extLst>
+            </p:cNvPr>
+            <p:cNvSpPr/>
+            <p:nvPr/>
+          </p:nvSpPr>
+          <p:spPr>
+            <a:xfrm>
+              <a:off x="1663262" y="1254251"/>
+              <a:ext cx="304800" cy="301752"/>
+            </a:xfrm>
+            <a:prstGeom prst="ellipse">
+              <a:avLst/>
+            </a:prstGeom>
+            <a:solidFill>
+              <a:schemeClr val="accent5">
+                <a:lumMod val="60000"/>
+                <a:lumOff val="40000"/>
+              </a:schemeClr>
+            </a:solidFill>
+            <a:ln>
+              <a:solidFill>
+                <a:schemeClr val="accent5">
+                  <a:lumMod val="75000"/>
+                </a:schemeClr>
+              </a:solidFill>
+            </a:ln>
+          </p:spPr>
+          <p:style>
+            <a:lnRef idx="2">
+              <a:schemeClr val="accent1">
+                <a:shade val="15000"/>
+              </a:schemeClr>
+            </a:lnRef>
+            <a:fillRef idx="1">
+              <a:schemeClr val="accent1"/>
+            </a:fillRef>
+            <a:effectRef idx="0">
+              <a:schemeClr val="accent1"/>
+            </a:effectRef>
+            <a:fontRef idx="minor">
+              <a:schemeClr val="lt1"/>
+            </a:fontRef>
+          </p:style>
+          <p:txBody>
+            <a:bodyPr rtlCol="0" anchor="ctr"/>
+            <a:lstStyle/>
+            <a:p>
+              <a:pPr algn="ctr"/>
+              <a:endParaRPr lang="en-US"/>
+            </a:p>
+          </p:txBody>
+        </p:sp>
+        <p:sp>
+          <p:nvSpPr>
+            <p:cNvPr id="14" name="TextBox 13">
+              <a:extLst>
+                <a:ext uri="{FF2B5EF4-FFF2-40B4-BE49-F238E27FC236}">
+                  <a16:creationId xmlns:a16="http://schemas.microsoft.com/office/drawing/2014/main" id="{35E6634E-89C9-E40B-D36D-2907A2213BA0}"/>
+                </a:ext>
+              </a:extLst>
+            </p:cNvPr>
+            <p:cNvSpPr txBox="1"/>
+            <p:nvPr/>
+          </p:nvSpPr>
+          <p:spPr>
+            <a:xfrm>
+              <a:off x="1653616" y="1220461"/>
+              <a:ext cx="324091" cy="369332"/>
+            </a:xfrm>
+            <a:prstGeom prst="rect">
+              <a:avLst/>
+            </a:prstGeom>
+            <a:noFill/>
+          </p:spPr>
+          <p:txBody>
+            <a:bodyPr wrap="square" rtlCol="0">
+              <a:spAutoFit/>
+            </a:bodyPr>
+            <a:lstStyle/>
+            <a:p>
+              <a:r>
+                <a:rPr lang="en-US" dirty="0">
+                  <a:solidFill>
+                    <a:schemeClr val="bg1"/>
+                  </a:solidFill>
+                </a:rPr>
+                <a:t>4</a:t>
+              </a:r>
+            </a:p>
+          </p:txBody>
+        </p:sp>
+      </p:grpSp>
+      <p:grpSp>
+        <p:nvGrpSpPr>
+          <p:cNvPr id="15" name="Group 14">
+            <a:extLst>
+              <a:ext uri="{FF2B5EF4-FFF2-40B4-BE49-F238E27FC236}">
+                <a16:creationId xmlns:a16="http://schemas.microsoft.com/office/drawing/2014/main" id="{5A776C24-CD8E-C001-E3FC-EFEEBFFD6AE5}"/>
+              </a:ext>
+            </a:extLst>
+          </p:cNvPr>
+          <p:cNvGrpSpPr/>
+          <p:nvPr/>
+        </p:nvGrpSpPr>
+        <p:grpSpPr>
+          <a:xfrm>
+            <a:off x="7939995" y="5003430"/>
+            <a:ext cx="324091" cy="369332"/>
+            <a:chOff x="1653616" y="1220461"/>
+            <a:chExt cx="324091" cy="369332"/>
+          </a:xfrm>
+        </p:grpSpPr>
+        <p:sp>
+          <p:nvSpPr>
+            <p:cNvPr id="16" name="Oval 15">
+              <a:extLst>
+                <a:ext uri="{FF2B5EF4-FFF2-40B4-BE49-F238E27FC236}">
+                  <a16:creationId xmlns:a16="http://schemas.microsoft.com/office/drawing/2014/main" id="{781C81EE-CE81-B8B2-62ED-FBC69EC7A804}"/>
+                </a:ext>
+              </a:extLst>
+            </p:cNvPr>
+            <p:cNvSpPr/>
+            <p:nvPr/>
+          </p:nvSpPr>
+          <p:spPr>
+            <a:xfrm>
+              <a:off x="1663262" y="1254251"/>
+              <a:ext cx="304800" cy="301752"/>
+            </a:xfrm>
+            <a:prstGeom prst="ellipse">
+              <a:avLst/>
+            </a:prstGeom>
+            <a:solidFill>
+              <a:schemeClr val="accent5">
+                <a:lumMod val="60000"/>
+                <a:lumOff val="40000"/>
+              </a:schemeClr>
+            </a:solidFill>
+            <a:ln>
+              <a:solidFill>
+                <a:schemeClr val="accent5">
+                  <a:lumMod val="75000"/>
+                </a:schemeClr>
+              </a:solidFill>
+            </a:ln>
+          </p:spPr>
+          <p:style>
+            <a:lnRef idx="2">
+              <a:schemeClr val="accent1">
+                <a:shade val="15000"/>
+              </a:schemeClr>
+            </a:lnRef>
+            <a:fillRef idx="1">
+              <a:schemeClr val="accent1"/>
+            </a:fillRef>
+            <a:effectRef idx="0">
+              <a:schemeClr val="accent1"/>
+            </a:effectRef>
+            <a:fontRef idx="minor">
+              <a:schemeClr val="lt1"/>
+            </a:fontRef>
+          </p:style>
+          <p:txBody>
+            <a:bodyPr rtlCol="0" anchor="ctr"/>
+            <a:lstStyle/>
+            <a:p>
+              <a:pPr algn="ctr"/>
+              <a:endParaRPr lang="en-US"/>
+            </a:p>
+          </p:txBody>
+        </p:sp>
+        <p:sp>
+          <p:nvSpPr>
+            <p:cNvPr id="17" name="TextBox 16">
+              <a:extLst>
+                <a:ext uri="{FF2B5EF4-FFF2-40B4-BE49-F238E27FC236}">
+                  <a16:creationId xmlns:a16="http://schemas.microsoft.com/office/drawing/2014/main" id="{11C159E9-6651-30CB-52D1-DF18C34E736A}"/>
+                </a:ext>
+              </a:extLst>
+            </p:cNvPr>
+            <p:cNvSpPr txBox="1"/>
+            <p:nvPr/>
+          </p:nvSpPr>
+          <p:spPr>
+            <a:xfrm>
+              <a:off x="1653616" y="1220461"/>
+              <a:ext cx="324091" cy="369332"/>
+            </a:xfrm>
+            <a:prstGeom prst="rect">
+              <a:avLst/>
+            </a:prstGeom>
+            <a:noFill/>
+          </p:spPr>
+          <p:txBody>
+            <a:bodyPr wrap="square" rtlCol="0">
+              <a:spAutoFit/>
+            </a:bodyPr>
+            <a:lstStyle/>
+            <a:p>
+              <a:r>
+                <a:rPr lang="en-US" dirty="0">
+                  <a:solidFill>
+                    <a:schemeClr val="bg1"/>
+                  </a:solidFill>
+                </a:rPr>
+                <a:t>5</a:t>
               </a:r>
             </a:p>
           </p:txBody>

</xml_diff>

<commit_message>
Prepare for release on SocArXiv
</commit_message>
<xml_diff>
--- a/Shiny/www/Fig1.pptx
+++ b/Shiny/www/Fig1.pptx
@@ -6,6 +6,7 @@
   </p:sldMasterIdLst>
   <p:sldIdLst>
     <p:sldId id="256" r:id="rId2"/>
+    <p:sldId id="257" r:id="rId3"/>
   </p:sldIdLst>
   <p:sldSz cx="12192000" cy="6858000"/>
   <p:notesSz cx="6858000" cy="9144000"/>
@@ -259,7 +260,7 @@
           <a:p>
             <a:fld id="{79D02E35-BBA4-4E24-9F73-ACDCB6F88B1E}" type="datetimeFigureOut">
               <a:rPr lang="en-US" smtClean="0"/>
-              <a:t>7/5/2025</a:t>
+              <a:t>7/24/2025</a:t>
             </a:fld>
             <a:endParaRPr lang="en-US"/>
           </a:p>
@@ -457,7 +458,7 @@
           <a:p>
             <a:fld id="{79D02E35-BBA4-4E24-9F73-ACDCB6F88B1E}" type="datetimeFigureOut">
               <a:rPr lang="en-US" smtClean="0"/>
-              <a:t>7/5/2025</a:t>
+              <a:t>7/24/2025</a:t>
             </a:fld>
             <a:endParaRPr lang="en-US"/>
           </a:p>
@@ -665,7 +666,7 @@
           <a:p>
             <a:fld id="{79D02E35-BBA4-4E24-9F73-ACDCB6F88B1E}" type="datetimeFigureOut">
               <a:rPr lang="en-US" smtClean="0"/>
-              <a:t>7/5/2025</a:t>
+              <a:t>7/24/2025</a:t>
             </a:fld>
             <a:endParaRPr lang="en-US"/>
           </a:p>
@@ -863,7 +864,7 @@
           <a:p>
             <a:fld id="{79D02E35-BBA4-4E24-9F73-ACDCB6F88B1E}" type="datetimeFigureOut">
               <a:rPr lang="en-US" smtClean="0"/>
-              <a:t>7/5/2025</a:t>
+              <a:t>7/24/2025</a:t>
             </a:fld>
             <a:endParaRPr lang="en-US"/>
           </a:p>
@@ -1138,7 +1139,7 @@
           <a:p>
             <a:fld id="{79D02E35-BBA4-4E24-9F73-ACDCB6F88B1E}" type="datetimeFigureOut">
               <a:rPr lang="en-US" smtClean="0"/>
-              <a:t>7/5/2025</a:t>
+              <a:t>7/24/2025</a:t>
             </a:fld>
             <a:endParaRPr lang="en-US"/>
           </a:p>
@@ -1403,7 +1404,7 @@
           <a:p>
             <a:fld id="{79D02E35-BBA4-4E24-9F73-ACDCB6F88B1E}" type="datetimeFigureOut">
               <a:rPr lang="en-US" smtClean="0"/>
-              <a:t>7/5/2025</a:t>
+              <a:t>7/24/2025</a:t>
             </a:fld>
             <a:endParaRPr lang="en-US"/>
           </a:p>
@@ -1815,7 +1816,7 @@
           <a:p>
             <a:fld id="{79D02E35-BBA4-4E24-9F73-ACDCB6F88B1E}" type="datetimeFigureOut">
               <a:rPr lang="en-US" smtClean="0"/>
-              <a:t>7/5/2025</a:t>
+              <a:t>7/24/2025</a:t>
             </a:fld>
             <a:endParaRPr lang="en-US"/>
           </a:p>
@@ -1956,7 +1957,7 @@
           <a:p>
             <a:fld id="{79D02E35-BBA4-4E24-9F73-ACDCB6F88B1E}" type="datetimeFigureOut">
               <a:rPr lang="en-US" smtClean="0"/>
-              <a:t>7/5/2025</a:t>
+              <a:t>7/24/2025</a:t>
             </a:fld>
             <a:endParaRPr lang="en-US"/>
           </a:p>
@@ -2069,7 +2070,7 @@
           <a:p>
             <a:fld id="{79D02E35-BBA4-4E24-9F73-ACDCB6F88B1E}" type="datetimeFigureOut">
               <a:rPr lang="en-US" smtClean="0"/>
-              <a:t>7/5/2025</a:t>
+              <a:t>7/24/2025</a:t>
             </a:fld>
             <a:endParaRPr lang="en-US"/>
           </a:p>
@@ -2380,7 +2381,7 @@
           <a:p>
             <a:fld id="{79D02E35-BBA4-4E24-9F73-ACDCB6F88B1E}" type="datetimeFigureOut">
               <a:rPr lang="en-US" smtClean="0"/>
-              <a:t>7/5/2025</a:t>
+              <a:t>7/24/2025</a:t>
             </a:fld>
             <a:endParaRPr lang="en-US"/>
           </a:p>
@@ -2668,7 +2669,7 @@
           <a:p>
             <a:fld id="{79D02E35-BBA4-4E24-9F73-ACDCB6F88B1E}" type="datetimeFigureOut">
               <a:rPr lang="en-US" smtClean="0"/>
-              <a:t>7/5/2025</a:t>
+              <a:t>7/24/2025</a:t>
             </a:fld>
             <a:endParaRPr lang="en-US"/>
           </a:p>
@@ -2909,7 +2910,7 @@
           <a:p>
             <a:fld id="{79D02E35-BBA4-4E24-9F73-ACDCB6F88B1E}" type="datetimeFigureOut">
               <a:rPr lang="en-US" smtClean="0"/>
-              <a:t>7/5/2025</a:t>
+              <a:t>7/24/2025</a:t>
             </a:fld>
             <a:endParaRPr lang="en-US"/>
           </a:p>
@@ -3965,6 +3966,667 @@
 </p:sld>
 </file>
 
+<file path=ppt/slides/slide2.xml><?xml version="1.0" encoding="utf-8"?>
+<p:sld xmlns:a="http://schemas.openxmlformats.org/drawingml/2006/main" xmlns:r="http://schemas.openxmlformats.org/officeDocument/2006/relationships" xmlns:p="http://schemas.openxmlformats.org/presentationml/2006/main">
+  <p:cSld>
+    <p:spTree>
+      <p:nvGrpSpPr>
+        <p:cNvPr id="1" name=""/>
+        <p:cNvGrpSpPr/>
+        <p:nvPr/>
+      </p:nvGrpSpPr>
+      <p:grpSpPr>
+        <a:xfrm>
+          <a:off x="0" y="0"/>
+          <a:ext cx="0" cy="0"/>
+          <a:chOff x="0" y="0"/>
+          <a:chExt cx="0" cy="0"/>
+        </a:xfrm>
+      </p:grpSpPr>
+      <p:pic>
+        <p:nvPicPr>
+          <p:cNvPr id="5" name="Picture 4">
+            <a:extLst>
+              <a:ext uri="{FF2B5EF4-FFF2-40B4-BE49-F238E27FC236}">
+                <a16:creationId xmlns:a16="http://schemas.microsoft.com/office/drawing/2014/main" id="{7EE1FF5D-467C-8C97-E2CF-343D432AC22E}"/>
+              </a:ext>
+            </a:extLst>
+          </p:cNvPr>
+          <p:cNvPicPr>
+            <a:picLocks noChangeAspect="1"/>
+          </p:cNvPicPr>
+          <p:nvPr/>
+        </p:nvPicPr>
+        <p:blipFill>
+          <a:blip r:embed="rId2">
+            <a:extLst>
+              <a:ext uri="{28A0092B-C50C-407E-A947-70E740481C1C}">
+                <a14:useLocalDpi xmlns:a14="http://schemas.microsoft.com/office/drawing/2010/main" val="0"/>
+              </a:ext>
+            </a:extLst>
+          </a:blip>
+          <a:stretch>
+            <a:fillRect/>
+          </a:stretch>
+        </p:blipFill>
+        <p:spPr>
+          <a:xfrm>
+            <a:off x="27728" y="880707"/>
+            <a:ext cx="12136544" cy="5096586"/>
+          </a:xfrm>
+          <a:prstGeom prst="rect">
+            <a:avLst/>
+          </a:prstGeom>
+        </p:spPr>
+      </p:pic>
+      <p:grpSp>
+        <p:nvGrpSpPr>
+          <p:cNvPr id="6" name="Group 5">
+            <a:extLst>
+              <a:ext uri="{FF2B5EF4-FFF2-40B4-BE49-F238E27FC236}">
+                <a16:creationId xmlns:a16="http://schemas.microsoft.com/office/drawing/2014/main" id="{263818AC-5839-1A14-A86C-C26B0298B3A2}"/>
+              </a:ext>
+            </a:extLst>
+          </p:cNvPr>
+          <p:cNvGrpSpPr/>
+          <p:nvPr/>
+        </p:nvGrpSpPr>
+        <p:grpSpPr>
+          <a:xfrm>
+            <a:off x="1241021" y="1521544"/>
+            <a:ext cx="324091" cy="369332"/>
+            <a:chOff x="1653616" y="1220461"/>
+            <a:chExt cx="324091" cy="369332"/>
+          </a:xfrm>
+        </p:grpSpPr>
+        <p:sp>
+          <p:nvSpPr>
+            <p:cNvPr id="7" name="Oval 6">
+              <a:extLst>
+                <a:ext uri="{FF2B5EF4-FFF2-40B4-BE49-F238E27FC236}">
+                  <a16:creationId xmlns:a16="http://schemas.microsoft.com/office/drawing/2014/main" id="{9985F10C-8E14-8542-03A3-40FE945F8B7B}"/>
+                </a:ext>
+              </a:extLst>
+            </p:cNvPr>
+            <p:cNvSpPr/>
+            <p:nvPr/>
+          </p:nvSpPr>
+          <p:spPr>
+            <a:xfrm>
+              <a:off x="1663262" y="1254251"/>
+              <a:ext cx="304800" cy="301752"/>
+            </a:xfrm>
+            <a:prstGeom prst="ellipse">
+              <a:avLst/>
+            </a:prstGeom>
+            <a:solidFill>
+              <a:schemeClr val="accent5">
+                <a:lumMod val="60000"/>
+                <a:lumOff val="40000"/>
+              </a:schemeClr>
+            </a:solidFill>
+            <a:ln>
+              <a:solidFill>
+                <a:schemeClr val="accent5">
+                  <a:lumMod val="75000"/>
+                </a:schemeClr>
+              </a:solidFill>
+            </a:ln>
+          </p:spPr>
+          <p:style>
+            <a:lnRef idx="2">
+              <a:schemeClr val="accent1">
+                <a:shade val="15000"/>
+              </a:schemeClr>
+            </a:lnRef>
+            <a:fillRef idx="1">
+              <a:schemeClr val="accent1"/>
+            </a:fillRef>
+            <a:effectRef idx="0">
+              <a:schemeClr val="accent1"/>
+            </a:effectRef>
+            <a:fontRef idx="minor">
+              <a:schemeClr val="lt1"/>
+            </a:fontRef>
+          </p:style>
+          <p:txBody>
+            <a:bodyPr rtlCol="0" anchor="ctr"/>
+            <a:lstStyle/>
+            <a:p>
+              <a:pPr algn="ctr"/>
+              <a:endParaRPr lang="en-US"/>
+            </a:p>
+          </p:txBody>
+        </p:sp>
+        <p:sp>
+          <p:nvSpPr>
+            <p:cNvPr id="8" name="TextBox 7">
+              <a:extLst>
+                <a:ext uri="{FF2B5EF4-FFF2-40B4-BE49-F238E27FC236}">
+                  <a16:creationId xmlns:a16="http://schemas.microsoft.com/office/drawing/2014/main" id="{1639B3E3-4C35-8638-D911-16FABBD7980D}"/>
+                </a:ext>
+              </a:extLst>
+            </p:cNvPr>
+            <p:cNvSpPr txBox="1"/>
+            <p:nvPr/>
+          </p:nvSpPr>
+          <p:spPr>
+            <a:xfrm>
+              <a:off x="1653616" y="1220461"/>
+              <a:ext cx="324091" cy="369332"/>
+            </a:xfrm>
+            <a:prstGeom prst="rect">
+              <a:avLst/>
+            </a:prstGeom>
+            <a:noFill/>
+          </p:spPr>
+          <p:txBody>
+            <a:bodyPr wrap="square" rtlCol="0">
+              <a:spAutoFit/>
+            </a:bodyPr>
+            <a:lstStyle/>
+            <a:p>
+              <a:r>
+                <a:rPr lang="en-US" dirty="0">
+                  <a:solidFill>
+                    <a:schemeClr val="bg1"/>
+                  </a:solidFill>
+                </a:rPr>
+                <a:t>1</a:t>
+              </a:r>
+            </a:p>
+          </p:txBody>
+        </p:sp>
+      </p:grpSp>
+      <p:grpSp>
+        <p:nvGrpSpPr>
+          <p:cNvPr id="9" name="Group 8">
+            <a:extLst>
+              <a:ext uri="{FF2B5EF4-FFF2-40B4-BE49-F238E27FC236}">
+                <a16:creationId xmlns:a16="http://schemas.microsoft.com/office/drawing/2014/main" id="{96E0CF6D-1E5D-7CD2-1A74-11F147FF43CE}"/>
+              </a:ext>
+            </a:extLst>
+          </p:cNvPr>
+          <p:cNvGrpSpPr/>
+          <p:nvPr/>
+        </p:nvGrpSpPr>
+        <p:grpSpPr>
+          <a:xfrm>
+            <a:off x="1643169" y="2358198"/>
+            <a:ext cx="324091" cy="369332"/>
+            <a:chOff x="1653616" y="1220461"/>
+            <a:chExt cx="324091" cy="369332"/>
+          </a:xfrm>
+        </p:grpSpPr>
+        <p:sp>
+          <p:nvSpPr>
+            <p:cNvPr id="10" name="Oval 9">
+              <a:extLst>
+                <a:ext uri="{FF2B5EF4-FFF2-40B4-BE49-F238E27FC236}">
+                  <a16:creationId xmlns:a16="http://schemas.microsoft.com/office/drawing/2014/main" id="{2901DD00-D272-2510-CF7C-E89DF43AEE6C}"/>
+                </a:ext>
+              </a:extLst>
+            </p:cNvPr>
+            <p:cNvSpPr/>
+            <p:nvPr/>
+          </p:nvSpPr>
+          <p:spPr>
+            <a:xfrm>
+              <a:off x="1663262" y="1254251"/>
+              <a:ext cx="304800" cy="301752"/>
+            </a:xfrm>
+            <a:prstGeom prst="ellipse">
+              <a:avLst/>
+            </a:prstGeom>
+            <a:solidFill>
+              <a:schemeClr val="accent5">
+                <a:lumMod val="60000"/>
+                <a:lumOff val="40000"/>
+              </a:schemeClr>
+            </a:solidFill>
+            <a:ln>
+              <a:solidFill>
+                <a:schemeClr val="accent5">
+                  <a:lumMod val="75000"/>
+                </a:schemeClr>
+              </a:solidFill>
+            </a:ln>
+          </p:spPr>
+          <p:style>
+            <a:lnRef idx="2">
+              <a:schemeClr val="accent1">
+                <a:shade val="15000"/>
+              </a:schemeClr>
+            </a:lnRef>
+            <a:fillRef idx="1">
+              <a:schemeClr val="accent1"/>
+            </a:fillRef>
+            <a:effectRef idx="0">
+              <a:schemeClr val="accent1"/>
+            </a:effectRef>
+            <a:fontRef idx="minor">
+              <a:schemeClr val="lt1"/>
+            </a:fontRef>
+          </p:style>
+          <p:txBody>
+            <a:bodyPr rtlCol="0" anchor="ctr"/>
+            <a:lstStyle/>
+            <a:p>
+              <a:pPr algn="ctr"/>
+              <a:endParaRPr lang="en-US"/>
+            </a:p>
+          </p:txBody>
+        </p:sp>
+        <p:sp>
+          <p:nvSpPr>
+            <p:cNvPr id="11" name="TextBox 10">
+              <a:extLst>
+                <a:ext uri="{FF2B5EF4-FFF2-40B4-BE49-F238E27FC236}">
+                  <a16:creationId xmlns:a16="http://schemas.microsoft.com/office/drawing/2014/main" id="{CF1C7283-985C-3D63-C5BE-06D43A56209F}"/>
+                </a:ext>
+              </a:extLst>
+            </p:cNvPr>
+            <p:cNvSpPr txBox="1"/>
+            <p:nvPr/>
+          </p:nvSpPr>
+          <p:spPr>
+            <a:xfrm>
+              <a:off x="1653616" y="1220461"/>
+              <a:ext cx="324091" cy="369332"/>
+            </a:xfrm>
+            <a:prstGeom prst="rect">
+              <a:avLst/>
+            </a:prstGeom>
+            <a:noFill/>
+          </p:spPr>
+          <p:txBody>
+            <a:bodyPr wrap="square" rtlCol="0">
+              <a:spAutoFit/>
+            </a:bodyPr>
+            <a:lstStyle/>
+            <a:p>
+              <a:r>
+                <a:rPr lang="en-US" dirty="0">
+                  <a:solidFill>
+                    <a:schemeClr val="bg1"/>
+                  </a:solidFill>
+                </a:rPr>
+                <a:t>2</a:t>
+              </a:r>
+            </a:p>
+          </p:txBody>
+        </p:sp>
+      </p:grpSp>
+      <p:grpSp>
+        <p:nvGrpSpPr>
+          <p:cNvPr id="12" name="Group 11">
+            <a:extLst>
+              <a:ext uri="{FF2B5EF4-FFF2-40B4-BE49-F238E27FC236}">
+                <a16:creationId xmlns:a16="http://schemas.microsoft.com/office/drawing/2014/main" id="{0D8B24C7-409F-A0D4-7143-A10D4A3438FC}"/>
+              </a:ext>
+            </a:extLst>
+          </p:cNvPr>
+          <p:cNvGrpSpPr/>
+          <p:nvPr/>
+        </p:nvGrpSpPr>
+        <p:grpSpPr>
+          <a:xfrm>
+            <a:off x="1319078" y="3983079"/>
+            <a:ext cx="324091" cy="369332"/>
+            <a:chOff x="1653616" y="1220461"/>
+            <a:chExt cx="324091" cy="369332"/>
+          </a:xfrm>
+        </p:grpSpPr>
+        <p:sp>
+          <p:nvSpPr>
+            <p:cNvPr id="13" name="Oval 12">
+              <a:extLst>
+                <a:ext uri="{FF2B5EF4-FFF2-40B4-BE49-F238E27FC236}">
+                  <a16:creationId xmlns:a16="http://schemas.microsoft.com/office/drawing/2014/main" id="{1AB16438-5E9D-80AC-8CD5-6AF2C0125194}"/>
+                </a:ext>
+              </a:extLst>
+            </p:cNvPr>
+            <p:cNvSpPr/>
+            <p:nvPr/>
+          </p:nvSpPr>
+          <p:spPr>
+            <a:xfrm>
+              <a:off x="1663262" y="1254251"/>
+              <a:ext cx="304800" cy="301752"/>
+            </a:xfrm>
+            <a:prstGeom prst="ellipse">
+              <a:avLst/>
+            </a:prstGeom>
+            <a:solidFill>
+              <a:schemeClr val="accent5">
+                <a:lumMod val="60000"/>
+                <a:lumOff val="40000"/>
+              </a:schemeClr>
+            </a:solidFill>
+            <a:ln>
+              <a:solidFill>
+                <a:schemeClr val="accent5">
+                  <a:lumMod val="75000"/>
+                </a:schemeClr>
+              </a:solidFill>
+            </a:ln>
+          </p:spPr>
+          <p:style>
+            <a:lnRef idx="2">
+              <a:schemeClr val="accent1">
+                <a:shade val="15000"/>
+              </a:schemeClr>
+            </a:lnRef>
+            <a:fillRef idx="1">
+              <a:schemeClr val="accent1"/>
+            </a:fillRef>
+            <a:effectRef idx="0">
+              <a:schemeClr val="accent1"/>
+            </a:effectRef>
+            <a:fontRef idx="minor">
+              <a:schemeClr val="lt1"/>
+            </a:fontRef>
+          </p:style>
+          <p:txBody>
+            <a:bodyPr rtlCol="0" anchor="ctr"/>
+            <a:lstStyle/>
+            <a:p>
+              <a:pPr algn="ctr"/>
+              <a:endParaRPr lang="en-US"/>
+            </a:p>
+          </p:txBody>
+        </p:sp>
+        <p:sp>
+          <p:nvSpPr>
+            <p:cNvPr id="14" name="TextBox 13">
+              <a:extLst>
+                <a:ext uri="{FF2B5EF4-FFF2-40B4-BE49-F238E27FC236}">
+                  <a16:creationId xmlns:a16="http://schemas.microsoft.com/office/drawing/2014/main" id="{2D7B1FD2-3565-7941-B3E9-CC4ABD857011}"/>
+                </a:ext>
+              </a:extLst>
+            </p:cNvPr>
+            <p:cNvSpPr txBox="1"/>
+            <p:nvPr/>
+          </p:nvSpPr>
+          <p:spPr>
+            <a:xfrm>
+              <a:off x="1653616" y="1220461"/>
+              <a:ext cx="324091" cy="369332"/>
+            </a:xfrm>
+            <a:prstGeom prst="rect">
+              <a:avLst/>
+            </a:prstGeom>
+            <a:noFill/>
+          </p:spPr>
+          <p:txBody>
+            <a:bodyPr wrap="square" rtlCol="0">
+              <a:spAutoFit/>
+            </a:bodyPr>
+            <a:lstStyle/>
+            <a:p>
+              <a:r>
+                <a:rPr lang="en-US" dirty="0">
+                  <a:solidFill>
+                    <a:schemeClr val="bg1"/>
+                  </a:solidFill>
+                </a:rPr>
+                <a:t>3</a:t>
+              </a:r>
+            </a:p>
+          </p:txBody>
+        </p:sp>
+      </p:grpSp>
+      <p:grpSp>
+        <p:nvGrpSpPr>
+          <p:cNvPr id="15" name="Group 14">
+            <a:extLst>
+              <a:ext uri="{FF2B5EF4-FFF2-40B4-BE49-F238E27FC236}">
+                <a16:creationId xmlns:a16="http://schemas.microsoft.com/office/drawing/2014/main" id="{0343073B-F5C8-9DE9-AC77-5EB7E1344548}"/>
+              </a:ext>
+            </a:extLst>
+          </p:cNvPr>
+          <p:cNvGrpSpPr/>
+          <p:nvPr/>
+        </p:nvGrpSpPr>
+        <p:grpSpPr>
+          <a:xfrm>
+            <a:off x="7375000" y="1370668"/>
+            <a:ext cx="324091" cy="369332"/>
+            <a:chOff x="1653616" y="1220461"/>
+            <a:chExt cx="324091" cy="369332"/>
+          </a:xfrm>
+        </p:grpSpPr>
+        <p:sp>
+          <p:nvSpPr>
+            <p:cNvPr id="16" name="Oval 15">
+              <a:extLst>
+                <a:ext uri="{FF2B5EF4-FFF2-40B4-BE49-F238E27FC236}">
+                  <a16:creationId xmlns:a16="http://schemas.microsoft.com/office/drawing/2014/main" id="{E2028327-A40B-AB79-3DD1-1CD807CE919B}"/>
+                </a:ext>
+              </a:extLst>
+            </p:cNvPr>
+            <p:cNvSpPr/>
+            <p:nvPr/>
+          </p:nvSpPr>
+          <p:spPr>
+            <a:xfrm>
+              <a:off x="1663262" y="1254251"/>
+              <a:ext cx="304800" cy="301752"/>
+            </a:xfrm>
+            <a:prstGeom prst="ellipse">
+              <a:avLst/>
+            </a:prstGeom>
+            <a:solidFill>
+              <a:schemeClr val="accent5">
+                <a:lumMod val="60000"/>
+                <a:lumOff val="40000"/>
+              </a:schemeClr>
+            </a:solidFill>
+            <a:ln>
+              <a:solidFill>
+                <a:schemeClr val="accent5">
+                  <a:lumMod val="75000"/>
+                </a:schemeClr>
+              </a:solidFill>
+            </a:ln>
+          </p:spPr>
+          <p:style>
+            <a:lnRef idx="2">
+              <a:schemeClr val="accent1">
+                <a:shade val="15000"/>
+              </a:schemeClr>
+            </a:lnRef>
+            <a:fillRef idx="1">
+              <a:schemeClr val="accent1"/>
+            </a:fillRef>
+            <a:effectRef idx="0">
+              <a:schemeClr val="accent1"/>
+            </a:effectRef>
+            <a:fontRef idx="minor">
+              <a:schemeClr val="lt1"/>
+            </a:fontRef>
+          </p:style>
+          <p:txBody>
+            <a:bodyPr rtlCol="0" anchor="ctr"/>
+            <a:lstStyle/>
+            <a:p>
+              <a:pPr algn="ctr"/>
+              <a:endParaRPr lang="en-US"/>
+            </a:p>
+          </p:txBody>
+        </p:sp>
+        <p:sp>
+          <p:nvSpPr>
+            <p:cNvPr id="17" name="TextBox 16">
+              <a:extLst>
+                <a:ext uri="{FF2B5EF4-FFF2-40B4-BE49-F238E27FC236}">
+                  <a16:creationId xmlns:a16="http://schemas.microsoft.com/office/drawing/2014/main" id="{6BBB49ED-C61E-8683-BE89-0498C07A98B8}"/>
+                </a:ext>
+              </a:extLst>
+            </p:cNvPr>
+            <p:cNvSpPr txBox="1"/>
+            <p:nvPr/>
+          </p:nvSpPr>
+          <p:spPr>
+            <a:xfrm>
+              <a:off x="1653616" y="1220461"/>
+              <a:ext cx="324091" cy="369332"/>
+            </a:xfrm>
+            <a:prstGeom prst="rect">
+              <a:avLst/>
+            </a:prstGeom>
+            <a:noFill/>
+          </p:spPr>
+          <p:txBody>
+            <a:bodyPr wrap="square" rtlCol="0">
+              <a:spAutoFit/>
+            </a:bodyPr>
+            <a:lstStyle/>
+            <a:p>
+              <a:r>
+                <a:rPr lang="en-US" dirty="0">
+                  <a:solidFill>
+                    <a:schemeClr val="bg1"/>
+                  </a:solidFill>
+                </a:rPr>
+                <a:t>4</a:t>
+              </a:r>
+            </a:p>
+          </p:txBody>
+        </p:sp>
+      </p:grpSp>
+      <p:grpSp>
+        <p:nvGrpSpPr>
+          <p:cNvPr id="18" name="Group 17">
+            <a:extLst>
+              <a:ext uri="{FF2B5EF4-FFF2-40B4-BE49-F238E27FC236}">
+                <a16:creationId xmlns:a16="http://schemas.microsoft.com/office/drawing/2014/main" id="{4682E9A3-9079-6C13-7B18-921BBF4ABB40}"/>
+              </a:ext>
+            </a:extLst>
+          </p:cNvPr>
+          <p:cNvGrpSpPr/>
+          <p:nvPr/>
+        </p:nvGrpSpPr>
+        <p:grpSpPr>
+          <a:xfrm>
+            <a:off x="8151869" y="4016869"/>
+            <a:ext cx="324091" cy="369332"/>
+            <a:chOff x="1653616" y="1220461"/>
+            <a:chExt cx="324091" cy="369332"/>
+          </a:xfrm>
+        </p:grpSpPr>
+        <p:sp>
+          <p:nvSpPr>
+            <p:cNvPr id="19" name="Oval 18">
+              <a:extLst>
+                <a:ext uri="{FF2B5EF4-FFF2-40B4-BE49-F238E27FC236}">
+                  <a16:creationId xmlns:a16="http://schemas.microsoft.com/office/drawing/2014/main" id="{748652C6-A67F-F1E0-DA6E-343FF920591F}"/>
+                </a:ext>
+              </a:extLst>
+            </p:cNvPr>
+            <p:cNvSpPr/>
+            <p:nvPr/>
+          </p:nvSpPr>
+          <p:spPr>
+            <a:xfrm>
+              <a:off x="1663262" y="1254251"/>
+              <a:ext cx="304800" cy="301752"/>
+            </a:xfrm>
+            <a:prstGeom prst="ellipse">
+              <a:avLst/>
+            </a:prstGeom>
+            <a:solidFill>
+              <a:schemeClr val="accent5">
+                <a:lumMod val="60000"/>
+                <a:lumOff val="40000"/>
+              </a:schemeClr>
+            </a:solidFill>
+            <a:ln>
+              <a:solidFill>
+                <a:schemeClr val="accent5">
+                  <a:lumMod val="75000"/>
+                </a:schemeClr>
+              </a:solidFill>
+            </a:ln>
+          </p:spPr>
+          <p:style>
+            <a:lnRef idx="2">
+              <a:schemeClr val="accent1">
+                <a:shade val="15000"/>
+              </a:schemeClr>
+            </a:lnRef>
+            <a:fillRef idx="1">
+              <a:schemeClr val="accent1"/>
+            </a:fillRef>
+            <a:effectRef idx="0">
+              <a:schemeClr val="accent1"/>
+            </a:effectRef>
+            <a:fontRef idx="minor">
+              <a:schemeClr val="lt1"/>
+            </a:fontRef>
+          </p:style>
+          <p:txBody>
+            <a:bodyPr rtlCol="0" anchor="ctr"/>
+            <a:lstStyle/>
+            <a:p>
+              <a:pPr algn="ctr"/>
+              <a:endParaRPr lang="en-US"/>
+            </a:p>
+          </p:txBody>
+        </p:sp>
+        <p:sp>
+          <p:nvSpPr>
+            <p:cNvPr id="20" name="TextBox 19">
+              <a:extLst>
+                <a:ext uri="{FF2B5EF4-FFF2-40B4-BE49-F238E27FC236}">
+                  <a16:creationId xmlns:a16="http://schemas.microsoft.com/office/drawing/2014/main" id="{5D469BE8-606C-69E9-4BCB-053528364F64}"/>
+                </a:ext>
+              </a:extLst>
+            </p:cNvPr>
+            <p:cNvSpPr txBox="1"/>
+            <p:nvPr/>
+          </p:nvSpPr>
+          <p:spPr>
+            <a:xfrm>
+              <a:off x="1653616" y="1220461"/>
+              <a:ext cx="324091" cy="369332"/>
+            </a:xfrm>
+            <a:prstGeom prst="rect">
+              <a:avLst/>
+            </a:prstGeom>
+            <a:noFill/>
+          </p:spPr>
+          <p:txBody>
+            <a:bodyPr wrap="square" rtlCol="0">
+              <a:spAutoFit/>
+            </a:bodyPr>
+            <a:lstStyle/>
+            <a:p>
+              <a:r>
+                <a:rPr lang="en-US" dirty="0">
+                  <a:solidFill>
+                    <a:schemeClr val="bg1"/>
+                  </a:solidFill>
+                </a:rPr>
+                <a:t>5</a:t>
+              </a:r>
+            </a:p>
+          </p:txBody>
+        </p:sp>
+      </p:grpSp>
+    </p:spTree>
+    <p:extLst>
+      <p:ext uri="{BB962C8B-B14F-4D97-AF65-F5344CB8AC3E}">
+        <p14:creationId xmlns:p14="http://schemas.microsoft.com/office/powerpoint/2010/main" val="2618327857"/>
+      </p:ext>
+    </p:extLst>
+  </p:cSld>
+  <p:clrMapOvr>
+    <a:masterClrMapping/>
+  </p:clrMapOvr>
+</p:sld>
+</file>
+
 <file path=ppt/theme/theme1.xml><?xml version="1.0" encoding="utf-8"?>
 <a:theme xmlns:a="http://schemas.openxmlformats.org/drawingml/2006/main" name="Office Theme">
   <a:themeElements>

</xml_diff>